<commit_message>
Loyalty Program Microservice Design Document
</commit_message>
<xml_diff>
--- a/Loyalty Program Microservice.pptx
+++ b/Loyalty Program Microservice.pptx
@@ -8,23 +8,25 @@
     <p:sldId id="256" r:id="rId2"/>
     <p:sldId id="257" r:id="rId3"/>
     <p:sldId id="258" r:id="rId4"/>
+    <p:sldId id="259" r:id="rId5"/>
+    <p:sldId id="260" r:id="rId6"/>
   </p:sldIdLst>
   <p:sldSz cx="12192000" cy="6858000"/>
   <p:notesSz cx="6858000" cy="9144000"/>
   <p:embeddedFontLst>
     <p:embeddedFont>
-      <p:font typeface="Source Sans Pro" panose="020B0503030403020204" pitchFamily="34" charset="0"/>
-      <p:regular r:id="rId5"/>
-      <p:bold r:id="rId6"/>
-      <p:italic r:id="rId7"/>
-      <p:boldItalic r:id="rId8"/>
+      <p:font typeface="Calibri" panose="020F0502020204030204" pitchFamily="34" charset="0"/>
+      <p:regular r:id="rId7"/>
+      <p:bold r:id="rId8"/>
+      <p:italic r:id="rId9"/>
+      <p:boldItalic r:id="rId10"/>
     </p:embeddedFont>
     <p:embeddedFont>
-      <p:font typeface="Calibri" panose="020F0502020204030204" pitchFamily="34" charset="0"/>
-      <p:regular r:id="rId9"/>
-      <p:bold r:id="rId10"/>
-      <p:italic r:id="rId11"/>
-      <p:boldItalic r:id="rId12"/>
+      <p:font typeface="Source Sans Pro" panose="020B0503030403020204" pitchFamily="34" charset="0"/>
+      <p:regular r:id="rId11"/>
+      <p:bold r:id="rId12"/>
+      <p:italic r:id="rId13"/>
+      <p:boldItalic r:id="rId14"/>
     </p:embeddedFont>
   </p:embeddedFontLst>
   <p:defaultTextStyle>
@@ -122,6 +124,11 @@
       </a:defRPr>
     </a:lvl9pPr>
   </p:defaultTextStyle>
+  <p:extLst>
+    <p:ext uri="{EFAFB233-063F-42B5-8137-9DF3F51BA10A}">
+      <p15:sldGuideLst xmlns:p15="http://schemas.microsoft.com/office/powerpoint/2012/main"/>
+    </p:ext>
+  </p:extLst>
 </p:presentation>
 </file>
 
@@ -306,7 +313,7 @@
           <a:p>
             <a:fld id="{8E2D89BC-6F6D-4639-8F0A-AF892665858E}" type="datetimeFigureOut">
               <a:rPr lang="en-US" smtClean="0"/>
-              <a:t>2/5/2018</a:t>
+              <a:t>2/15/2018</a:t>
             </a:fld>
             <a:endParaRPr lang="en-US"/>
           </a:p>
@@ -476,7 +483,7 @@
           <a:p>
             <a:fld id="{8E2D89BC-6F6D-4639-8F0A-AF892665858E}" type="datetimeFigureOut">
               <a:rPr lang="en-US" smtClean="0"/>
-              <a:t>2/5/2018</a:t>
+              <a:t>2/15/2018</a:t>
             </a:fld>
             <a:endParaRPr lang="en-US"/>
           </a:p>
@@ -656,7 +663,7 @@
           <a:p>
             <a:fld id="{8E2D89BC-6F6D-4639-8F0A-AF892665858E}" type="datetimeFigureOut">
               <a:rPr lang="en-US" smtClean="0"/>
-              <a:t>2/5/2018</a:t>
+              <a:t>2/15/2018</a:t>
             </a:fld>
             <a:endParaRPr lang="en-US"/>
           </a:p>
@@ -826,7 +833,7 @@
           <a:p>
             <a:fld id="{8E2D89BC-6F6D-4639-8F0A-AF892665858E}" type="datetimeFigureOut">
               <a:rPr lang="en-US" smtClean="0"/>
-              <a:t>2/5/2018</a:t>
+              <a:t>2/15/2018</a:t>
             </a:fld>
             <a:endParaRPr lang="en-US"/>
           </a:p>
@@ -1072,7 +1079,7 @@
           <a:p>
             <a:fld id="{8E2D89BC-6F6D-4639-8F0A-AF892665858E}" type="datetimeFigureOut">
               <a:rPr lang="en-US" smtClean="0"/>
-              <a:t>2/5/2018</a:t>
+              <a:t>2/15/2018</a:t>
             </a:fld>
             <a:endParaRPr lang="en-US"/>
           </a:p>
@@ -1360,7 +1367,7 @@
           <a:p>
             <a:fld id="{8E2D89BC-6F6D-4639-8F0A-AF892665858E}" type="datetimeFigureOut">
               <a:rPr lang="en-US" smtClean="0"/>
-              <a:t>2/5/2018</a:t>
+              <a:t>2/15/2018</a:t>
             </a:fld>
             <a:endParaRPr lang="en-US"/>
           </a:p>
@@ -1782,7 +1789,7 @@
           <a:p>
             <a:fld id="{8E2D89BC-6F6D-4639-8F0A-AF892665858E}" type="datetimeFigureOut">
               <a:rPr lang="en-US" smtClean="0"/>
-              <a:t>2/5/2018</a:t>
+              <a:t>2/15/2018</a:t>
             </a:fld>
             <a:endParaRPr lang="en-US"/>
           </a:p>
@@ -1900,7 +1907,7 @@
           <a:p>
             <a:fld id="{8E2D89BC-6F6D-4639-8F0A-AF892665858E}" type="datetimeFigureOut">
               <a:rPr lang="en-US" smtClean="0"/>
-              <a:t>2/5/2018</a:t>
+              <a:t>2/15/2018</a:t>
             </a:fld>
             <a:endParaRPr lang="en-US"/>
           </a:p>
@@ -1995,7 +2002,7 @@
           <a:p>
             <a:fld id="{8E2D89BC-6F6D-4639-8F0A-AF892665858E}" type="datetimeFigureOut">
               <a:rPr lang="en-US" smtClean="0"/>
-              <a:t>2/5/2018</a:t>
+              <a:t>2/15/2018</a:t>
             </a:fld>
             <a:endParaRPr lang="en-US"/>
           </a:p>
@@ -2272,7 +2279,7 @@
           <a:p>
             <a:fld id="{8E2D89BC-6F6D-4639-8F0A-AF892665858E}" type="datetimeFigureOut">
               <a:rPr lang="en-US" smtClean="0"/>
-              <a:t>2/5/2018</a:t>
+              <a:t>2/15/2018</a:t>
             </a:fld>
             <a:endParaRPr lang="en-US"/>
           </a:p>
@@ -2529,7 +2536,7 @@
           <a:p>
             <a:fld id="{8E2D89BC-6F6D-4639-8F0A-AF892665858E}" type="datetimeFigureOut">
               <a:rPr lang="en-US" smtClean="0"/>
-              <a:t>2/5/2018</a:t>
+              <a:t>2/15/2018</a:t>
             </a:fld>
             <a:endParaRPr lang="en-US"/>
           </a:p>
@@ -2745,7 +2752,7 @@
           <a:p>
             <a:fld id="{8E2D89BC-6F6D-4639-8F0A-AF892665858E}" type="datetimeFigureOut">
               <a:rPr lang="en-US" smtClean="0"/>
-              <a:t>2/5/2018</a:t>
+              <a:t>2/15/2018</a:t>
             </a:fld>
             <a:endParaRPr lang="en-US"/>
           </a:p>
@@ -3224,6 +3231,13 @@
   <p:clrMapOvr>
     <a:masterClrMapping/>
   </p:clrMapOvr>
+  <p:timing>
+    <p:tnLst>
+      <p:par>
+        <p:cTn id="1" dur="indefinite" restart="never" nodeType="tmRoot"/>
+      </p:par>
+    </p:tnLst>
+  </p:timing>
 </p:sld>
 </file>
 
@@ -3288,7 +3302,7 @@
         <p:spPr/>
         <p:txBody>
           <a:bodyPr>
-            <a:normAutofit/>
+            <a:normAutofit lnSpcReduction="10000"/>
           </a:bodyPr>
           <a:lstStyle/>
           <a:p>
@@ -3917,11 +3931,67 @@
             </a:r>
             <a:r>
               <a:rPr lang="pt-PT" dirty="0" smtClean="0"/>
-              <a:t> take </a:t>
-            </a:r>
-            <a:r>
-              <a:rPr lang="pt-PT" dirty="0" err="1" smtClean="0"/>
-              <a:t>place</a:t>
+              <a:t> </a:t>
+            </a:r>
+            <a:r>
+              <a:rPr lang="pt-PT" dirty="0" err="1" smtClean="0"/>
+              <a:t>be</a:t>
+            </a:r>
+            <a:r>
+              <a:rPr lang="pt-PT" dirty="0" smtClean="0"/>
+              <a:t> </a:t>
+            </a:r>
+            <a:r>
+              <a:rPr lang="pt-PT" dirty="0" err="1" smtClean="0"/>
+              <a:t>performed</a:t>
+            </a:r>
+            <a:r>
+              <a:rPr lang="pt-PT" dirty="0" smtClean="0"/>
+              <a:t> </a:t>
+            </a:r>
+            <a:r>
+              <a:rPr lang="pt-PT" dirty="0" err="1" smtClean="0"/>
+              <a:t>if</a:t>
+            </a:r>
+            <a:r>
+              <a:rPr lang="pt-PT" dirty="0" smtClean="0"/>
+              <a:t> </a:t>
+            </a:r>
+            <a:r>
+              <a:rPr lang="pt-PT" dirty="0" err="1" smtClean="0"/>
+              <a:t>the</a:t>
+            </a:r>
+            <a:r>
+              <a:rPr lang="pt-PT" dirty="0" err="1" smtClean="0"/>
+              <a:t>re’s</a:t>
+            </a:r>
+            <a:r>
+              <a:rPr lang="pt-PT" dirty="0" smtClean="0"/>
+              <a:t> </a:t>
+            </a:r>
+            <a:r>
+              <a:rPr lang="pt-PT" dirty="0" err="1" smtClean="0"/>
+              <a:t>the</a:t>
+            </a:r>
+            <a:r>
+              <a:rPr lang="pt-PT" dirty="0" smtClean="0"/>
+              <a:t> </a:t>
+            </a:r>
+            <a:r>
+              <a:rPr lang="pt-PT" dirty="0" err="1" smtClean="0"/>
+              <a:t>need</a:t>
+            </a:r>
+            <a:r>
+              <a:rPr lang="pt-PT" dirty="0" smtClean="0"/>
+              <a:t> for </a:t>
+            </a:r>
+            <a:r>
+              <a:rPr lang="pt-PT" dirty="0" err="1" smtClean="0"/>
+              <a:t>it</a:t>
+            </a:r>
+            <a:r>
+              <a:rPr lang="pt-PT" dirty="0" smtClean="0"/>
+              <a:t>.</a:t>
             </a:r>
             <a:endParaRPr lang="pt-PT" dirty="0" smtClean="0"/>
           </a:p>
@@ -3996,8 +4066,37 @@
             </a:r>
             <a:r>
               <a:rPr lang="pt-PT" dirty="0" smtClean="0"/>
-              <a:t> balance.</a:t>
-            </a:r>
+              <a:t> </a:t>
+            </a:r>
+            <a:r>
+              <a:rPr lang="pt-PT" dirty="0" smtClean="0"/>
+              <a:t>balance </a:t>
+            </a:r>
+            <a:r>
+              <a:rPr lang="pt-PT" dirty="0" err="1" smtClean="0"/>
+              <a:t>and</a:t>
+            </a:r>
+            <a:r>
+              <a:rPr lang="pt-PT" dirty="0" smtClean="0"/>
+              <a:t> </a:t>
+            </a:r>
+            <a:r>
+              <a:rPr lang="pt-PT" dirty="0" err="1" smtClean="0"/>
+              <a:t>update</a:t>
+            </a:r>
+            <a:r>
+              <a:rPr lang="pt-PT" dirty="0" smtClean="0"/>
+              <a:t> </a:t>
+            </a:r>
+            <a:r>
+              <a:rPr lang="pt-PT" dirty="0" err="1" smtClean="0"/>
+              <a:t>the</a:t>
+            </a:r>
+            <a:r>
+              <a:rPr lang="pt-PT" dirty="0" smtClean="0"/>
+              <a:t> Customer Status.</a:t>
+            </a:r>
+            <a:endParaRPr lang="pt-PT" dirty="0" smtClean="0"/>
           </a:p>
           <a:p>
             <a:pPr lvl="1"/>
@@ -4018,6 +4117,13 @@
   <p:clrMapOvr>
     <a:masterClrMapping/>
   </p:clrMapOvr>
+  <p:timing>
+    <p:tnLst>
+      <p:par>
+        <p:cTn id="1" dur="indefinite" restart="never" nodeType="tmRoot"/>
+      </p:par>
+    </p:tnLst>
+  </p:timing>
 </p:sld>
 </file>
 
@@ -4088,6 +4194,189 @@
           <a:p>
             <a:r>
               <a:rPr lang="pt-PT" dirty="0" err="1" smtClean="0"/>
+              <a:t>The</a:t>
+            </a:r>
+            <a:r>
+              <a:rPr lang="pt-PT" dirty="0" smtClean="0"/>
+              <a:t> API </a:t>
+            </a:r>
+            <a:r>
+              <a:rPr lang="pt-PT" dirty="0" err="1" smtClean="0"/>
+              <a:t>has</a:t>
+            </a:r>
+            <a:r>
+              <a:rPr lang="pt-PT" dirty="0" smtClean="0"/>
+              <a:t> a </a:t>
+            </a:r>
+            <a:r>
+              <a:rPr lang="pt-PT" dirty="0" err="1" smtClean="0"/>
+              <a:t>Simulate</a:t>
+            </a:r>
+            <a:r>
+              <a:rPr lang="pt-PT" dirty="0" smtClean="0"/>
+              <a:t> </a:t>
+            </a:r>
+            <a:r>
+              <a:rPr lang="pt-PT" dirty="0" err="1" smtClean="0"/>
+              <a:t>parameter</a:t>
+            </a:r>
+            <a:r>
+              <a:rPr lang="pt-PT" dirty="0" smtClean="0"/>
+              <a:t>, </a:t>
+            </a:r>
+            <a:r>
+              <a:rPr lang="pt-PT" dirty="0" err="1" smtClean="0"/>
+              <a:t>which</a:t>
+            </a:r>
+            <a:r>
+              <a:rPr lang="pt-PT" dirty="0" smtClean="0"/>
+              <a:t> </a:t>
+            </a:r>
+            <a:r>
+              <a:rPr lang="pt-PT" dirty="0" err="1" smtClean="0"/>
+              <a:t>allows</a:t>
+            </a:r>
+            <a:r>
+              <a:rPr lang="pt-PT" dirty="0" smtClean="0"/>
+              <a:t> </a:t>
+            </a:r>
+            <a:r>
+              <a:rPr lang="pt-PT" dirty="0" err="1" smtClean="0"/>
+              <a:t>all</a:t>
+            </a:r>
+            <a:r>
+              <a:rPr lang="pt-PT" dirty="0" smtClean="0"/>
+              <a:t> </a:t>
+            </a:r>
+            <a:r>
+              <a:rPr lang="pt-PT" dirty="0" err="1" smtClean="0"/>
+              <a:t>operations</a:t>
+            </a:r>
+            <a:r>
+              <a:rPr lang="pt-PT" dirty="0" smtClean="0"/>
+              <a:t> to </a:t>
+            </a:r>
+            <a:r>
+              <a:rPr lang="pt-PT" dirty="0" err="1" smtClean="0"/>
+              <a:t>be</a:t>
+            </a:r>
+            <a:r>
+              <a:rPr lang="pt-PT" dirty="0" smtClean="0"/>
+              <a:t> </a:t>
+            </a:r>
+            <a:r>
+              <a:rPr lang="pt-PT" dirty="0" err="1" smtClean="0"/>
+              <a:t>performed</a:t>
+            </a:r>
+            <a:r>
+              <a:rPr lang="pt-PT" dirty="0" smtClean="0"/>
+              <a:t> in a </a:t>
+            </a:r>
+            <a:r>
+              <a:rPr lang="pt-PT" dirty="0" err="1" smtClean="0"/>
+              <a:t>simulated</a:t>
+            </a:r>
+            <a:r>
+              <a:rPr lang="pt-PT" dirty="0" smtClean="0"/>
+              <a:t> </a:t>
+            </a:r>
+            <a:r>
+              <a:rPr lang="pt-PT" dirty="0" err="1" smtClean="0"/>
+              <a:t>matter</a:t>
+            </a:r>
+            <a:r>
+              <a:rPr lang="pt-PT" dirty="0" smtClean="0"/>
+              <a:t>, </a:t>
+            </a:r>
+            <a:r>
+              <a:rPr lang="pt-PT" dirty="0" err="1" smtClean="0"/>
+              <a:t>meanin</a:t>
+            </a:r>
+            <a:r>
+              <a:rPr lang="pt-PT" dirty="0" err="1" smtClean="0"/>
+              <a:t>g</a:t>
+            </a:r>
+            <a:r>
+              <a:rPr lang="pt-PT" dirty="0" smtClean="0"/>
+              <a:t> </a:t>
+            </a:r>
+            <a:r>
+              <a:rPr lang="pt-PT" dirty="0" err="1" smtClean="0"/>
+              <a:t>they</a:t>
+            </a:r>
+            <a:r>
+              <a:rPr lang="pt-PT" dirty="0" smtClean="0"/>
+              <a:t> </a:t>
+            </a:r>
+            <a:r>
+              <a:rPr lang="pt-PT" dirty="0" err="1" smtClean="0"/>
+              <a:t>will</a:t>
+            </a:r>
+            <a:r>
+              <a:rPr lang="pt-PT" dirty="0" smtClean="0"/>
+              <a:t> </a:t>
+            </a:r>
+            <a:r>
+              <a:rPr lang="pt-PT" dirty="0" err="1" smtClean="0"/>
+              <a:t>not</a:t>
+            </a:r>
+            <a:r>
+              <a:rPr lang="pt-PT" dirty="0" smtClean="0"/>
+              <a:t> </a:t>
+            </a:r>
+            <a:r>
+              <a:rPr lang="pt-PT" dirty="0" err="1" smtClean="0"/>
+              <a:t>influence</a:t>
+            </a:r>
+            <a:r>
+              <a:rPr lang="pt-PT" dirty="0" smtClean="0"/>
+              <a:t> </a:t>
+            </a:r>
+            <a:r>
+              <a:rPr lang="pt-PT" dirty="0" err="1" smtClean="0"/>
+              <a:t>neither</a:t>
+            </a:r>
+            <a:r>
+              <a:rPr lang="pt-PT" dirty="0" smtClean="0"/>
+              <a:t> </a:t>
+            </a:r>
+            <a:r>
+              <a:rPr lang="pt-PT" dirty="0" err="1" smtClean="0"/>
+              <a:t>loyalty</a:t>
+            </a:r>
+            <a:r>
+              <a:rPr lang="pt-PT" dirty="0" smtClean="0"/>
+              <a:t> </a:t>
+            </a:r>
+            <a:r>
+              <a:rPr lang="pt-PT" dirty="0" err="1" smtClean="0"/>
+              <a:t>points</a:t>
+            </a:r>
+            <a:r>
+              <a:rPr lang="pt-PT" dirty="0" smtClean="0"/>
+              <a:t> balance </a:t>
+            </a:r>
+            <a:r>
+              <a:rPr lang="pt-PT" dirty="0" err="1" smtClean="0"/>
+              <a:t>nor</a:t>
+            </a:r>
+            <a:r>
+              <a:rPr lang="pt-PT" dirty="0" smtClean="0"/>
+              <a:t> status </a:t>
+            </a:r>
+            <a:r>
+              <a:rPr lang="pt-PT" dirty="0" err="1" smtClean="0"/>
+              <a:t>tier</a:t>
+            </a:r>
+            <a:r>
+              <a:rPr lang="pt-PT" dirty="0" smtClean="0"/>
+              <a:t>.</a:t>
+            </a:r>
+            <a:endParaRPr lang="pt-PT" dirty="0" smtClean="0"/>
+          </a:p>
+          <a:p>
+            <a:r>
+              <a:rPr lang="pt-PT" dirty="0" err="1" smtClean="0"/>
               <a:t>This</a:t>
             </a:r>
             <a:r>
@@ -4217,6 +4506,22 @@
               <a:rPr lang="pt-PT" dirty="0" err="1" smtClean="0"/>
               <a:t>transactions</a:t>
             </a:r>
+            <a:r>
+              <a:rPr lang="pt-PT" dirty="0" smtClean="0"/>
+              <a:t> (</a:t>
+            </a:r>
+            <a:r>
+              <a:rPr lang="pt-PT" dirty="0" err="1" smtClean="0"/>
+              <a:t>transaction</a:t>
+            </a:r>
+            <a:r>
+              <a:rPr lang="pt-PT" dirty="0" err="1" smtClean="0"/>
+              <a:t>ID</a:t>
+            </a:r>
+            <a:r>
+              <a:rPr lang="pt-PT" dirty="0" smtClean="0"/>
+              <a:t>)</a:t>
+            </a:r>
             <a:endParaRPr lang="pt-PT" dirty="0" smtClean="0"/>
           </a:p>
           <a:p>
@@ -4262,7 +4567,27 @@
             </a:r>
             <a:r>
               <a:rPr lang="pt-PT" dirty="0" smtClean="0"/>
-              <a:t> (to-</a:t>
+              <a:t>, as </a:t>
+            </a:r>
+            <a:r>
+              <a:rPr lang="pt-PT" dirty="0" err="1" smtClean="0"/>
+              <a:t>well</a:t>
+            </a:r>
+            <a:r>
+              <a:rPr lang="pt-PT" dirty="0" smtClean="0"/>
+              <a:t> as local </a:t>
+            </a:r>
+            <a:r>
+              <a:rPr lang="pt-PT" dirty="0" err="1" smtClean="0"/>
+              <a:t>logging</a:t>
+            </a:r>
+            <a:r>
+              <a:rPr lang="pt-PT" dirty="0" smtClean="0"/>
+              <a:t> </a:t>
+            </a:r>
+            <a:r>
+              <a:rPr lang="pt-PT" dirty="0" smtClean="0"/>
+              <a:t>(to-</a:t>
             </a:r>
             <a:r>
               <a:rPr lang="pt-PT" dirty="0" err="1" smtClean="0"/>
@@ -4280,6 +4605,76 @@
               <a:rPr lang="pt-PT" dirty="0" smtClean="0"/>
               <a:t>)</a:t>
             </a:r>
+          </a:p>
+          <a:p>
+            <a:pPr lvl="1"/>
+            <a:r>
+              <a:rPr lang="pt-PT" dirty="0" smtClean="0"/>
+              <a:t>A </a:t>
+            </a:r>
+            <a:r>
+              <a:rPr lang="pt-PT" dirty="0" err="1" smtClean="0"/>
+              <a:t>publish</a:t>
+            </a:r>
+            <a:r>
+              <a:rPr lang="pt-PT" dirty="0" smtClean="0"/>
+              <a:t> log </a:t>
+            </a:r>
+            <a:r>
+              <a:rPr lang="pt-PT" dirty="0" err="1" smtClean="0"/>
+              <a:t>event</a:t>
+            </a:r>
+            <a:r>
+              <a:rPr lang="pt-PT" dirty="0" smtClean="0"/>
+              <a:t> </a:t>
+            </a:r>
+            <a:r>
+              <a:rPr lang="pt-PT" dirty="0" err="1" smtClean="0"/>
+              <a:t>will</a:t>
+            </a:r>
+            <a:r>
+              <a:rPr lang="pt-PT" dirty="0" smtClean="0"/>
+              <a:t> </a:t>
+            </a:r>
+            <a:r>
+              <a:rPr lang="pt-PT" dirty="0" err="1" smtClean="0"/>
+              <a:t>be</a:t>
+            </a:r>
+            <a:r>
+              <a:rPr lang="pt-PT" dirty="0" smtClean="0"/>
+              <a:t> </a:t>
+            </a:r>
+            <a:r>
+              <a:rPr lang="pt-PT" dirty="0" err="1" smtClean="0"/>
+              <a:t>generated</a:t>
+            </a:r>
+            <a:r>
+              <a:rPr lang="pt-PT" dirty="0" smtClean="0"/>
+              <a:t> </a:t>
+            </a:r>
+            <a:r>
+              <a:rPr lang="pt-PT" dirty="0" err="1" smtClean="0"/>
+              <a:t>when</a:t>
+            </a:r>
+            <a:r>
+              <a:rPr lang="pt-PT" dirty="0" smtClean="0"/>
+              <a:t> </a:t>
+            </a:r>
+            <a:r>
+              <a:rPr lang="pt-PT" dirty="0" err="1" smtClean="0"/>
+              <a:t>appropriate</a:t>
+            </a:r>
+            <a:r>
+              <a:rPr lang="pt-PT" dirty="0" smtClean="0"/>
+              <a:t>.</a:t>
+            </a:r>
+            <a:endParaRPr lang="pt-PT" dirty="0" smtClean="0"/>
+          </a:p>
+          <a:p>
+            <a:endParaRPr lang="pt-PT" dirty="0"/>
+          </a:p>
+          <a:p>
+            <a:endParaRPr lang="pt-PT" dirty="0" smtClean="0"/>
           </a:p>
           <a:p>
             <a:endParaRPr lang="pt-PT" dirty="0" smtClean="0"/>
@@ -4303,6 +4698,1654 @@
   <p:clrMapOvr>
     <a:masterClrMapping/>
   </p:clrMapOvr>
+  <p:timing>
+    <p:tnLst>
+      <p:par>
+        <p:cTn id="1" dur="indefinite" restart="never" nodeType="tmRoot"/>
+      </p:par>
+    </p:tnLst>
+  </p:timing>
+</p:sld>
+</file>
+
+<file path=ppt/slides/slide4.xml><?xml version="1.0" encoding="utf-8"?>
+<p:sld xmlns:a="http://schemas.openxmlformats.org/drawingml/2006/main" xmlns:r="http://schemas.openxmlformats.org/officeDocument/2006/relationships" xmlns:p="http://schemas.openxmlformats.org/presentationml/2006/main">
+  <p:cSld>
+    <p:spTree>
+      <p:nvGrpSpPr>
+        <p:cNvPr id="1" name=""/>
+        <p:cNvGrpSpPr/>
+        <p:nvPr/>
+      </p:nvGrpSpPr>
+      <p:grpSpPr>
+        <a:xfrm>
+          <a:off x="0" y="0"/>
+          <a:ext cx="0" cy="0"/>
+          <a:chOff x="0" y="0"/>
+          <a:chExt cx="0" cy="0"/>
+        </a:xfrm>
+      </p:grpSpPr>
+      <p:sp>
+        <p:nvSpPr>
+          <p:cNvPr id="2" name="Title 1"/>
+          <p:cNvSpPr>
+            <a:spLocks noGrp="1"/>
+          </p:cNvSpPr>
+          <p:nvPr>
+            <p:ph type="title"/>
+          </p:nvPr>
+        </p:nvSpPr>
+        <p:spPr/>
+        <p:txBody>
+          <a:bodyPr/>
+          <a:lstStyle/>
+          <a:p>
+            <a:r>
+              <a:rPr lang="pt-PT" dirty="0" err="1"/>
+              <a:t>Loyalty</a:t>
+            </a:r>
+            <a:r>
+              <a:rPr lang="pt-PT" dirty="0"/>
+              <a:t> Program (LP) </a:t>
+            </a:r>
+            <a:r>
+              <a:rPr lang="pt-PT" dirty="0" err="1"/>
+              <a:t>Microservice</a:t>
+            </a:r>
+            <a:endParaRPr lang="en-US" dirty="0"/>
+          </a:p>
+        </p:txBody>
+      </p:sp>
+      <p:sp>
+        <p:nvSpPr>
+          <p:cNvPr id="3" name="Content Placeholder 2"/>
+          <p:cNvSpPr>
+            <a:spLocks noGrp="1"/>
+          </p:cNvSpPr>
+          <p:nvPr>
+            <p:ph idx="1"/>
+          </p:nvPr>
+        </p:nvSpPr>
+        <p:spPr/>
+        <p:txBody>
+          <a:bodyPr/>
+          <a:lstStyle/>
+          <a:p>
+            <a:r>
+              <a:rPr lang="pt-PT" dirty="0" err="1" smtClean="0"/>
+              <a:t>Events</a:t>
+            </a:r>
+            <a:r>
+              <a:rPr lang="pt-PT" dirty="0" smtClean="0"/>
+              <a:t> </a:t>
+            </a:r>
+            <a:r>
+              <a:rPr lang="pt-PT" dirty="0" err="1" smtClean="0"/>
+              <a:t>List</a:t>
+            </a:r>
+            <a:endParaRPr lang="pt-PT" dirty="0" smtClean="0"/>
+          </a:p>
+          <a:p>
+            <a:pPr lvl="1"/>
+            <a:r>
+              <a:rPr lang="pt-PT" dirty="0" err="1" smtClean="0"/>
+              <a:t>Subscribe</a:t>
+            </a:r>
+            <a:endParaRPr lang="pt-PT" dirty="0" smtClean="0"/>
+          </a:p>
+          <a:p>
+            <a:pPr lvl="2"/>
+            <a:r>
+              <a:rPr lang="pt-PT" dirty="0" err="1" smtClean="0"/>
+              <a:t>Order</a:t>
+            </a:r>
+            <a:r>
+              <a:rPr lang="pt-PT" dirty="0" smtClean="0"/>
+              <a:t> </a:t>
+            </a:r>
+            <a:r>
+              <a:rPr lang="pt-PT" dirty="0" err="1" smtClean="0"/>
+              <a:t>Created</a:t>
+            </a:r>
+            <a:endParaRPr lang="pt-PT" dirty="0" smtClean="0"/>
+          </a:p>
+          <a:p>
+            <a:pPr lvl="2"/>
+            <a:r>
+              <a:rPr lang="pt-PT" dirty="0" err="1" smtClean="0"/>
+              <a:t>Order</a:t>
+            </a:r>
+            <a:r>
+              <a:rPr lang="pt-PT" dirty="0" smtClean="0"/>
+              <a:t> </a:t>
+            </a:r>
+            <a:r>
+              <a:rPr lang="pt-PT" dirty="0" err="1" smtClean="0"/>
+              <a:t>Cancelled</a:t>
+            </a:r>
+            <a:endParaRPr lang="pt-PT" dirty="0" smtClean="0"/>
+          </a:p>
+          <a:p>
+            <a:pPr lvl="1"/>
+            <a:r>
+              <a:rPr lang="pt-PT" dirty="0" err="1" smtClean="0"/>
+              <a:t>Publish</a:t>
+            </a:r>
+            <a:endParaRPr lang="pt-PT" dirty="0" smtClean="0"/>
+          </a:p>
+          <a:p>
+            <a:pPr lvl="2"/>
+            <a:r>
+              <a:rPr lang="pt-PT" dirty="0" err="1" smtClean="0"/>
+              <a:t>Tier</a:t>
+            </a:r>
+            <a:r>
+              <a:rPr lang="pt-PT" dirty="0" smtClean="0"/>
+              <a:t> Status </a:t>
+            </a:r>
+            <a:r>
+              <a:rPr lang="pt-PT" dirty="0" err="1" smtClean="0"/>
+              <a:t>Update</a:t>
+            </a:r>
+            <a:endParaRPr lang="pt-PT" dirty="0" smtClean="0"/>
+          </a:p>
+          <a:p>
+            <a:pPr lvl="2"/>
+            <a:r>
+              <a:rPr lang="pt-PT" dirty="0" err="1" smtClean="0"/>
+              <a:t>Points</a:t>
+            </a:r>
+            <a:r>
+              <a:rPr lang="pt-PT" dirty="0" smtClean="0"/>
+              <a:t> </a:t>
+            </a:r>
+            <a:r>
+              <a:rPr lang="pt-PT" dirty="0" err="1" smtClean="0"/>
+              <a:t>Account</a:t>
+            </a:r>
+            <a:r>
+              <a:rPr lang="pt-PT" dirty="0" smtClean="0"/>
+              <a:t> Balance </a:t>
+            </a:r>
+            <a:r>
+              <a:rPr lang="pt-PT" dirty="0" err="1" smtClean="0"/>
+              <a:t>update</a:t>
+            </a:r>
+            <a:endParaRPr lang="pt-PT" dirty="0" smtClean="0"/>
+          </a:p>
+          <a:p>
+            <a:pPr lvl="2"/>
+            <a:r>
+              <a:rPr lang="pt-PT" dirty="0" smtClean="0"/>
+              <a:t>New Log </a:t>
+            </a:r>
+            <a:r>
+              <a:rPr lang="pt-PT" dirty="0" err="1" smtClean="0"/>
+              <a:t>Entry</a:t>
+            </a:r>
+            <a:endParaRPr lang="en-US" dirty="0"/>
+          </a:p>
+        </p:txBody>
+      </p:sp>
+    </p:spTree>
+    <p:extLst>
+      <p:ext uri="{BB962C8B-B14F-4D97-AF65-F5344CB8AC3E}">
+        <p14:creationId xmlns:p14="http://schemas.microsoft.com/office/powerpoint/2010/main" val="77617617"/>
+      </p:ext>
+    </p:extLst>
+  </p:cSld>
+  <p:clrMapOvr>
+    <a:masterClrMapping/>
+  </p:clrMapOvr>
+  <p:timing>
+    <p:tnLst>
+      <p:par>
+        <p:cTn id="1" dur="indefinite" restart="never" nodeType="tmRoot"/>
+      </p:par>
+    </p:tnLst>
+  </p:timing>
+</p:sld>
+</file>
+
+<file path=ppt/slides/slide5.xml><?xml version="1.0" encoding="utf-8"?>
+<p:sld xmlns:a="http://schemas.openxmlformats.org/drawingml/2006/main" xmlns:r="http://schemas.openxmlformats.org/officeDocument/2006/relationships" xmlns:p="http://schemas.openxmlformats.org/presentationml/2006/main">
+  <p:cSld>
+    <p:spTree>
+      <p:nvGrpSpPr>
+        <p:cNvPr id="1" name=""/>
+        <p:cNvGrpSpPr/>
+        <p:nvPr/>
+      </p:nvGrpSpPr>
+      <p:grpSpPr>
+        <a:xfrm>
+          <a:off x="0" y="0"/>
+          <a:ext cx="0" cy="0"/>
+          <a:chOff x="0" y="0"/>
+          <a:chExt cx="0" cy="0"/>
+        </a:xfrm>
+      </p:grpSpPr>
+      <p:sp>
+        <p:nvSpPr>
+          <p:cNvPr id="2" name="Title 1"/>
+          <p:cNvSpPr>
+            <a:spLocks noGrp="1"/>
+          </p:cNvSpPr>
+          <p:nvPr>
+            <p:ph type="title"/>
+          </p:nvPr>
+        </p:nvSpPr>
+        <p:spPr/>
+        <p:txBody>
+          <a:bodyPr/>
+          <a:lstStyle/>
+          <a:p>
+            <a:r>
+              <a:rPr lang="pt-PT" dirty="0" err="1"/>
+              <a:t>Loyalty</a:t>
+            </a:r>
+            <a:r>
+              <a:rPr lang="pt-PT" dirty="0"/>
+              <a:t> Program (LP) </a:t>
+            </a:r>
+            <a:r>
+              <a:rPr lang="pt-PT" dirty="0" err="1" smtClean="0"/>
+              <a:t>Microservice</a:t>
+            </a:r>
+            <a:r>
+              <a:rPr lang="pt-PT" dirty="0" smtClean="0"/>
+              <a:t> - Design</a:t>
+            </a:r>
+            <a:endParaRPr lang="en-US" dirty="0"/>
+          </a:p>
+        </p:txBody>
+      </p:sp>
+      <p:sp>
+        <p:nvSpPr>
+          <p:cNvPr id="4" name="Rounded Rectangle 3"/>
+          <p:cNvSpPr/>
+          <p:nvPr/>
+        </p:nvSpPr>
+        <p:spPr>
+          <a:xfrm>
+            <a:off x="2158737" y="3864989"/>
+            <a:ext cx="7927943" cy="2168165"/>
+          </a:xfrm>
+          <a:prstGeom prst="roundRect">
+            <a:avLst/>
+          </a:prstGeom>
+        </p:spPr>
+        <p:style>
+          <a:lnRef idx="2">
+            <a:schemeClr val="accent1">
+              <a:shade val="50000"/>
+            </a:schemeClr>
+          </a:lnRef>
+          <a:fillRef idx="1">
+            <a:schemeClr val="accent1"/>
+          </a:fillRef>
+          <a:effectRef idx="0">
+            <a:schemeClr val="accent1"/>
+          </a:effectRef>
+          <a:fontRef idx="minor">
+            <a:schemeClr val="lt1"/>
+          </a:fontRef>
+        </p:style>
+        <p:txBody>
+          <a:bodyPr rtlCol="0" anchor="ctr"/>
+          <a:lstStyle/>
+          <a:p>
+            <a:pPr algn="ctr"/>
+            <a:endParaRPr lang="en-US"/>
+          </a:p>
+        </p:txBody>
+      </p:sp>
+      <p:grpSp>
+        <p:nvGrpSpPr>
+          <p:cNvPr id="11" name="Group 10"/>
+          <p:cNvGrpSpPr/>
+          <p:nvPr/>
+        </p:nvGrpSpPr>
+        <p:grpSpPr>
+          <a:xfrm>
+            <a:off x="103695" y="2878793"/>
+            <a:ext cx="2262433" cy="2687733"/>
+            <a:chOff x="103695" y="1973821"/>
+            <a:chExt cx="2262433" cy="2687733"/>
+          </a:xfrm>
+        </p:grpSpPr>
+        <p:sp>
+          <p:nvSpPr>
+            <p:cNvPr id="5" name="Right Arrow 4"/>
+            <p:cNvSpPr/>
+            <p:nvPr/>
+          </p:nvSpPr>
+          <p:spPr>
+            <a:xfrm>
+              <a:off x="1385740" y="3426643"/>
+              <a:ext cx="980388" cy="1234911"/>
+            </a:xfrm>
+            <a:prstGeom prst="rightArrow">
+              <a:avLst/>
+            </a:prstGeom>
+          </p:spPr>
+          <p:style>
+            <a:lnRef idx="2">
+              <a:schemeClr val="accent3">
+                <a:shade val="50000"/>
+              </a:schemeClr>
+            </a:lnRef>
+            <a:fillRef idx="1">
+              <a:schemeClr val="accent3"/>
+            </a:fillRef>
+            <a:effectRef idx="0">
+              <a:schemeClr val="accent3"/>
+            </a:effectRef>
+            <a:fontRef idx="minor">
+              <a:schemeClr val="lt1"/>
+            </a:fontRef>
+          </p:style>
+          <p:txBody>
+            <a:bodyPr rtlCol="0" anchor="ctr"/>
+            <a:lstStyle/>
+            <a:p>
+              <a:pPr algn="ctr"/>
+              <a:endParaRPr lang="en-US"/>
+            </a:p>
+          </p:txBody>
+        </p:sp>
+        <p:grpSp>
+          <p:nvGrpSpPr>
+            <p:cNvPr id="10" name="Group 9"/>
+            <p:cNvGrpSpPr/>
+            <p:nvPr/>
+          </p:nvGrpSpPr>
+          <p:grpSpPr>
+            <a:xfrm>
+              <a:off x="103695" y="1973821"/>
+              <a:ext cx="1838227" cy="2070277"/>
+              <a:chOff x="103695" y="1973821"/>
+              <a:chExt cx="1838227" cy="2070277"/>
+            </a:xfrm>
+          </p:grpSpPr>
+          <p:sp>
+            <p:nvSpPr>
+              <p:cNvPr id="9" name="Folded Corner 8"/>
+              <p:cNvSpPr/>
+              <p:nvPr/>
+            </p:nvSpPr>
+            <p:spPr>
+              <a:xfrm>
+                <a:off x="103695" y="1973821"/>
+                <a:ext cx="1772239" cy="1532951"/>
+              </a:xfrm>
+              <a:prstGeom prst="foldedCorner">
+                <a:avLst/>
+              </a:prstGeom>
+            </p:spPr>
+            <p:style>
+              <a:lnRef idx="2">
+                <a:schemeClr val="accent4"/>
+              </a:lnRef>
+              <a:fillRef idx="1">
+                <a:schemeClr val="lt1"/>
+              </a:fillRef>
+              <a:effectRef idx="0">
+                <a:schemeClr val="accent4"/>
+              </a:effectRef>
+              <a:fontRef idx="minor">
+                <a:schemeClr val="dk1"/>
+              </a:fontRef>
+            </p:style>
+            <p:txBody>
+              <a:bodyPr rtlCol="0" anchor="t"/>
+              <a:lstStyle/>
+              <a:p>
+                <a:r>
+                  <a:rPr lang="pt-PT" b="1" dirty="0" err="1" smtClean="0"/>
+                  <a:t>Events</a:t>
+                </a:r>
+                <a:r>
+                  <a:rPr lang="pt-PT" b="1" dirty="0" smtClean="0"/>
+                  <a:t> (</a:t>
+                </a:r>
+                <a:r>
+                  <a:rPr lang="pt-PT" b="1" dirty="0" err="1" smtClean="0"/>
+                  <a:t>Sub</a:t>
+                </a:r>
+                <a:r>
+                  <a:rPr lang="pt-PT" b="1" dirty="0" smtClean="0"/>
+                  <a:t>)</a:t>
+                </a:r>
+              </a:p>
+              <a:p>
+                <a:pPr marL="171450" indent="-171450">
+                  <a:buFont typeface="Arial" panose="020B0604020202020204" pitchFamily="34" charset="0"/>
+                  <a:buChar char="•"/>
+                </a:pPr>
+                <a:r>
+                  <a:rPr lang="pt-PT" sz="1400" dirty="0" err="1" smtClean="0"/>
+                  <a:t>Order</a:t>
+                </a:r>
+                <a:r>
+                  <a:rPr lang="pt-PT" sz="1400" dirty="0" smtClean="0"/>
+                  <a:t> </a:t>
+                </a:r>
+                <a:r>
+                  <a:rPr lang="pt-PT" sz="1400" dirty="0" err="1" smtClean="0"/>
+                  <a:t>Created</a:t>
+                </a:r>
+                <a:endParaRPr lang="pt-PT" sz="1400" dirty="0" smtClean="0"/>
+              </a:p>
+              <a:p>
+                <a:pPr marL="171450" indent="-171450">
+                  <a:buFont typeface="Arial" panose="020B0604020202020204" pitchFamily="34" charset="0"/>
+                  <a:buChar char="•"/>
+                </a:pPr>
+                <a:r>
+                  <a:rPr lang="pt-PT" sz="1400" dirty="0" err="1" smtClean="0"/>
+                  <a:t>Order</a:t>
+                </a:r>
+                <a:r>
+                  <a:rPr lang="pt-PT" sz="1400" dirty="0" smtClean="0"/>
+                  <a:t> </a:t>
+                </a:r>
+                <a:r>
+                  <a:rPr lang="pt-PT" sz="1400" dirty="0" err="1" smtClean="0"/>
+                  <a:t>Cancelled</a:t>
+                </a:r>
+                <a:endParaRPr lang="en-US" sz="1400" dirty="0"/>
+              </a:p>
+            </p:txBody>
+          </p:sp>
+          <p:sp>
+            <p:nvSpPr>
+              <p:cNvPr id="7" name="Lightning Bolt 6"/>
+              <p:cNvSpPr/>
+              <p:nvPr/>
+            </p:nvSpPr>
+            <p:spPr>
+              <a:xfrm>
+                <a:off x="1385740" y="3195687"/>
+                <a:ext cx="556182" cy="848411"/>
+              </a:xfrm>
+              <a:prstGeom prst="lightningBolt">
+                <a:avLst/>
+              </a:prstGeom>
+            </p:spPr>
+            <p:style>
+              <a:lnRef idx="2">
+                <a:schemeClr val="accent4">
+                  <a:shade val="50000"/>
+                </a:schemeClr>
+              </a:lnRef>
+              <a:fillRef idx="1">
+                <a:schemeClr val="accent4"/>
+              </a:fillRef>
+              <a:effectRef idx="0">
+                <a:schemeClr val="accent4"/>
+              </a:effectRef>
+              <a:fontRef idx="minor">
+                <a:schemeClr val="lt1"/>
+              </a:fontRef>
+            </p:style>
+            <p:txBody>
+              <a:bodyPr rtlCol="0" anchor="ctr"/>
+              <a:lstStyle/>
+              <a:p>
+                <a:pPr algn="ctr"/>
+                <a:endParaRPr lang="en-US"/>
+              </a:p>
+            </p:txBody>
+          </p:sp>
+        </p:grpSp>
+      </p:grpSp>
+      <p:grpSp>
+        <p:nvGrpSpPr>
+          <p:cNvPr id="14" name="Group 13"/>
+          <p:cNvGrpSpPr/>
+          <p:nvPr/>
+        </p:nvGrpSpPr>
+        <p:grpSpPr>
+          <a:xfrm>
+            <a:off x="9879289" y="2878793"/>
+            <a:ext cx="2059757" cy="2687732"/>
+            <a:chOff x="9879289" y="1973821"/>
+            <a:chExt cx="2059757" cy="2687732"/>
+          </a:xfrm>
+        </p:grpSpPr>
+        <p:sp>
+          <p:nvSpPr>
+            <p:cNvPr id="6" name="Right Arrow 5"/>
+            <p:cNvSpPr/>
+            <p:nvPr/>
+          </p:nvSpPr>
+          <p:spPr>
+            <a:xfrm>
+              <a:off x="9879289" y="3426642"/>
+              <a:ext cx="980388" cy="1234911"/>
+            </a:xfrm>
+            <a:prstGeom prst="rightArrow">
+              <a:avLst/>
+            </a:prstGeom>
+          </p:spPr>
+          <p:style>
+            <a:lnRef idx="2">
+              <a:schemeClr val="accent3">
+                <a:shade val="50000"/>
+              </a:schemeClr>
+            </a:lnRef>
+            <a:fillRef idx="1">
+              <a:schemeClr val="accent3"/>
+            </a:fillRef>
+            <a:effectRef idx="0">
+              <a:schemeClr val="accent3"/>
+            </a:effectRef>
+            <a:fontRef idx="minor">
+              <a:schemeClr val="lt1"/>
+            </a:fontRef>
+          </p:style>
+          <p:txBody>
+            <a:bodyPr rtlCol="0" anchor="ctr"/>
+            <a:lstStyle/>
+            <a:p>
+              <a:pPr algn="ctr"/>
+              <a:endParaRPr lang="en-US"/>
+            </a:p>
+          </p:txBody>
+        </p:sp>
+        <p:grpSp>
+          <p:nvGrpSpPr>
+            <p:cNvPr id="13" name="Group 12"/>
+            <p:cNvGrpSpPr/>
+            <p:nvPr/>
+          </p:nvGrpSpPr>
+          <p:grpSpPr>
+            <a:xfrm>
+              <a:off x="9916996" y="1973821"/>
+              <a:ext cx="2022050" cy="2070276"/>
+              <a:chOff x="9916996" y="1973821"/>
+              <a:chExt cx="2022050" cy="2070276"/>
+            </a:xfrm>
+          </p:grpSpPr>
+          <p:sp>
+            <p:nvSpPr>
+              <p:cNvPr id="12" name="Folded Corner 11"/>
+              <p:cNvSpPr/>
+              <p:nvPr/>
+            </p:nvSpPr>
+            <p:spPr>
+              <a:xfrm>
+                <a:off x="10166807" y="1973821"/>
+                <a:ext cx="1772239" cy="1532951"/>
+              </a:xfrm>
+              <a:prstGeom prst="foldedCorner">
+                <a:avLst/>
+              </a:prstGeom>
+            </p:spPr>
+            <p:style>
+              <a:lnRef idx="2">
+                <a:schemeClr val="accent4"/>
+              </a:lnRef>
+              <a:fillRef idx="1">
+                <a:schemeClr val="lt1"/>
+              </a:fillRef>
+              <a:effectRef idx="0">
+                <a:schemeClr val="accent4"/>
+              </a:effectRef>
+              <a:fontRef idx="minor">
+                <a:schemeClr val="dk1"/>
+              </a:fontRef>
+            </p:style>
+            <p:txBody>
+              <a:bodyPr rtlCol="0" anchor="t"/>
+              <a:lstStyle/>
+              <a:p>
+                <a:r>
+                  <a:rPr lang="pt-PT" b="1" dirty="0" err="1" smtClean="0"/>
+                  <a:t>Events</a:t>
+                </a:r>
+                <a:r>
+                  <a:rPr lang="pt-PT" b="1" dirty="0" smtClean="0"/>
+                  <a:t> (Pub)</a:t>
+                </a:r>
+              </a:p>
+              <a:p>
+                <a:pPr marL="171450" indent="-171450">
+                  <a:buFont typeface="Arial" panose="020B0604020202020204" pitchFamily="34" charset="0"/>
+                  <a:buChar char="•"/>
+                </a:pPr>
+                <a:r>
+                  <a:rPr lang="en-US" sz="1400" dirty="0"/>
+                  <a:t>Tier Status Update</a:t>
+                </a:r>
+              </a:p>
+              <a:p>
+                <a:pPr marL="171450" indent="-171450">
+                  <a:buFont typeface="Arial" panose="020B0604020202020204" pitchFamily="34" charset="0"/>
+                  <a:buChar char="•"/>
+                </a:pPr>
+                <a:r>
+                  <a:rPr lang="en-US" sz="1400" dirty="0"/>
+                  <a:t>Points Account Balance update</a:t>
+                </a:r>
+              </a:p>
+              <a:p>
+                <a:pPr marL="171450" indent="-171450">
+                  <a:buFont typeface="Arial" panose="020B0604020202020204" pitchFamily="34" charset="0"/>
+                  <a:buChar char="•"/>
+                </a:pPr>
+                <a:r>
+                  <a:rPr lang="en-US" sz="1400" dirty="0"/>
+                  <a:t>New Log Entry</a:t>
+                </a:r>
+              </a:p>
+            </p:txBody>
+          </p:sp>
+          <p:sp>
+            <p:nvSpPr>
+              <p:cNvPr id="8" name="Lightning Bolt 7"/>
+              <p:cNvSpPr/>
+              <p:nvPr/>
+            </p:nvSpPr>
+            <p:spPr>
+              <a:xfrm>
+                <a:off x="9916996" y="3195686"/>
+                <a:ext cx="556182" cy="848411"/>
+              </a:xfrm>
+              <a:prstGeom prst="lightningBolt">
+                <a:avLst/>
+              </a:prstGeom>
+            </p:spPr>
+            <p:style>
+              <a:lnRef idx="2">
+                <a:schemeClr val="accent4">
+                  <a:shade val="50000"/>
+                </a:schemeClr>
+              </a:lnRef>
+              <a:fillRef idx="1">
+                <a:schemeClr val="accent4"/>
+              </a:fillRef>
+              <a:effectRef idx="0">
+                <a:schemeClr val="accent4"/>
+              </a:effectRef>
+              <a:fontRef idx="minor">
+                <a:schemeClr val="lt1"/>
+              </a:fontRef>
+            </p:style>
+            <p:txBody>
+              <a:bodyPr rtlCol="0" anchor="ctr"/>
+              <a:lstStyle/>
+              <a:p>
+                <a:pPr algn="ctr"/>
+                <a:endParaRPr lang="en-US"/>
+              </a:p>
+            </p:txBody>
+          </p:sp>
+        </p:grpSp>
+      </p:grpSp>
+      <p:sp>
+        <p:nvSpPr>
+          <p:cNvPr id="16" name="Down Arrow 15"/>
+          <p:cNvSpPr/>
+          <p:nvPr/>
+        </p:nvSpPr>
+        <p:spPr>
+          <a:xfrm>
+            <a:off x="3714161" y="3167405"/>
+            <a:ext cx="1508288" cy="933253"/>
+          </a:xfrm>
+          <a:prstGeom prst="downArrow">
+            <a:avLst/>
+          </a:prstGeom>
+        </p:spPr>
+        <p:style>
+          <a:lnRef idx="2">
+            <a:schemeClr val="accent6">
+              <a:shade val="50000"/>
+            </a:schemeClr>
+          </a:lnRef>
+          <a:fillRef idx="1">
+            <a:schemeClr val="accent6"/>
+          </a:fillRef>
+          <a:effectRef idx="0">
+            <a:schemeClr val="accent6"/>
+          </a:effectRef>
+          <a:fontRef idx="minor">
+            <a:schemeClr val="lt1"/>
+          </a:fontRef>
+        </p:style>
+        <p:txBody>
+          <a:bodyPr rtlCol="0" anchor="ctr"/>
+          <a:lstStyle/>
+          <a:p>
+            <a:pPr algn="ctr"/>
+            <a:r>
+              <a:rPr lang="pt-PT" sz="2800" dirty="0" smtClean="0"/>
+              <a:t>API</a:t>
+            </a:r>
+            <a:endParaRPr lang="en-US" dirty="0"/>
+          </a:p>
+        </p:txBody>
+      </p:sp>
+      <p:sp>
+        <p:nvSpPr>
+          <p:cNvPr id="15" name="Folded Corner 14"/>
+          <p:cNvSpPr/>
+          <p:nvPr/>
+        </p:nvSpPr>
+        <p:spPr>
+          <a:xfrm>
+            <a:off x="2731416" y="1140643"/>
+            <a:ext cx="3473777" cy="2177592"/>
+          </a:xfrm>
+          <a:prstGeom prst="foldedCorner">
+            <a:avLst/>
+          </a:prstGeom>
+        </p:spPr>
+        <p:style>
+          <a:lnRef idx="2">
+            <a:schemeClr val="accent2"/>
+          </a:lnRef>
+          <a:fillRef idx="1">
+            <a:schemeClr val="lt1"/>
+          </a:fillRef>
+          <a:effectRef idx="0">
+            <a:schemeClr val="accent2"/>
+          </a:effectRef>
+          <a:fontRef idx="minor">
+            <a:schemeClr val="dk1"/>
+          </a:fontRef>
+        </p:style>
+        <p:txBody>
+          <a:bodyPr rtlCol="0" anchor="t"/>
+          <a:lstStyle/>
+          <a:p>
+            <a:r>
+              <a:rPr lang="pt-PT" b="1" i="1" dirty="0" err="1" smtClean="0"/>
+              <a:t>Loyalty</a:t>
+            </a:r>
+            <a:r>
+              <a:rPr lang="pt-PT" b="1" i="1" dirty="0" smtClean="0"/>
+              <a:t> Program </a:t>
+            </a:r>
+            <a:r>
+              <a:rPr lang="pt-PT" b="1" i="1" dirty="0" err="1" smtClean="0"/>
+              <a:t>Operations</a:t>
+            </a:r>
+            <a:r>
+              <a:rPr lang="pt-PT" b="1" i="1" dirty="0" smtClean="0"/>
+              <a:t> (</a:t>
+            </a:r>
+            <a:r>
+              <a:rPr lang="pt-PT" b="1" i="1" dirty="0" err="1" smtClean="0"/>
+              <a:t>Points</a:t>
+            </a:r>
+            <a:r>
+              <a:rPr lang="pt-PT" b="1" i="1" dirty="0" smtClean="0"/>
+              <a:t>)</a:t>
+            </a:r>
+          </a:p>
+          <a:p>
+            <a:r>
+              <a:rPr lang="pt-PT" sz="1200" dirty="0" err="1" smtClean="0"/>
+              <a:t>Create</a:t>
+            </a:r>
+            <a:r>
+              <a:rPr lang="pt-PT" sz="1200" dirty="0" smtClean="0"/>
+              <a:t> </a:t>
+            </a:r>
+            <a:r>
+              <a:rPr lang="pt-PT" sz="1200" dirty="0" err="1" smtClean="0"/>
+              <a:t>Points</a:t>
+            </a:r>
+            <a:r>
+              <a:rPr lang="pt-PT" sz="1200" dirty="0" smtClean="0"/>
+              <a:t> </a:t>
+            </a:r>
+            <a:r>
+              <a:rPr lang="pt-PT" sz="1200" dirty="0" err="1" smtClean="0"/>
+              <a:t>Transaction</a:t>
+            </a:r>
+            <a:endParaRPr lang="pt-PT" sz="1200" dirty="0" smtClean="0"/>
+          </a:p>
+          <a:p>
+            <a:pPr marL="171450" indent="-171450">
+              <a:buFont typeface="Symbol" panose="05050102010706020507" pitchFamily="18" charset="2"/>
+              <a:buChar char="Þ"/>
+            </a:pPr>
+            <a:r>
+              <a:rPr lang="pt-PT" sz="1100" dirty="0" err="1" smtClean="0"/>
+              <a:t>CustomerId</a:t>
+            </a:r>
+            <a:r>
+              <a:rPr lang="pt-PT" sz="1100" dirty="0" smtClean="0"/>
+              <a:t>, </a:t>
+            </a:r>
+            <a:r>
+              <a:rPr lang="pt-PT" sz="1100" dirty="0" err="1" smtClean="0"/>
+              <a:t>TransactionId</a:t>
+            </a:r>
+            <a:r>
+              <a:rPr lang="pt-PT" sz="1100" dirty="0" smtClean="0"/>
+              <a:t>, </a:t>
+            </a:r>
+            <a:r>
+              <a:rPr lang="pt-PT" sz="1100" dirty="0" err="1" smtClean="0"/>
+              <a:t>OrderId</a:t>
+            </a:r>
+            <a:r>
+              <a:rPr lang="pt-PT" sz="1100" dirty="0" smtClean="0"/>
+              <a:t>, </a:t>
+            </a:r>
+            <a:r>
+              <a:rPr lang="pt-PT" sz="1100" dirty="0" err="1" smtClean="0"/>
+              <a:t>OrderNetValue</a:t>
+            </a:r>
+            <a:endParaRPr lang="pt-PT" sz="1100" dirty="0" smtClean="0"/>
+          </a:p>
+          <a:p>
+            <a:r>
+              <a:rPr lang="pt-PT" sz="1100" dirty="0" smtClean="0"/>
+              <a:t>&lt;= </a:t>
+            </a:r>
+            <a:r>
+              <a:rPr lang="pt-PT" sz="1100" dirty="0" err="1" smtClean="0"/>
+              <a:t>PointsMovementDate</a:t>
+            </a:r>
+            <a:r>
+              <a:rPr lang="pt-PT" sz="1100" dirty="0" smtClean="0"/>
+              <a:t>, </a:t>
+            </a:r>
+            <a:r>
+              <a:rPr lang="pt-PT" sz="1100" dirty="0" err="1" smtClean="0"/>
+              <a:t>PointsBalance</a:t>
+            </a:r>
+            <a:endParaRPr lang="pt-PT" sz="1100" dirty="0" smtClean="0"/>
+          </a:p>
+          <a:p>
+            <a:r>
+              <a:rPr lang="pt-PT" sz="1200" dirty="0" err="1" smtClean="0"/>
+              <a:t>Compensate</a:t>
+            </a:r>
+            <a:r>
+              <a:rPr lang="pt-PT" sz="1200" dirty="0" smtClean="0"/>
+              <a:t> </a:t>
+            </a:r>
+            <a:r>
+              <a:rPr lang="pt-PT" sz="1200" dirty="0" err="1"/>
+              <a:t>Points</a:t>
+            </a:r>
+            <a:r>
+              <a:rPr lang="pt-PT" sz="1200" dirty="0"/>
+              <a:t> </a:t>
+            </a:r>
+            <a:r>
+              <a:rPr lang="pt-PT" sz="1200" dirty="0" err="1"/>
+              <a:t>Transaction</a:t>
+            </a:r>
+            <a:endParaRPr lang="pt-PT" sz="1200" dirty="0"/>
+          </a:p>
+          <a:p>
+            <a:pPr marL="171450" indent="-171450">
+              <a:buFont typeface="Symbol" panose="05050102010706020507" pitchFamily="18" charset="2"/>
+              <a:buChar char="Þ"/>
+            </a:pPr>
+            <a:r>
+              <a:rPr lang="pt-PT" sz="1100" dirty="0" err="1"/>
+              <a:t>CustomerId</a:t>
+            </a:r>
+            <a:r>
+              <a:rPr lang="pt-PT" sz="1100" dirty="0"/>
+              <a:t>, </a:t>
+            </a:r>
+            <a:r>
+              <a:rPr lang="pt-PT" sz="1100" dirty="0" err="1"/>
+              <a:t>TransactionId</a:t>
+            </a:r>
+            <a:r>
+              <a:rPr lang="pt-PT" sz="1100" dirty="0"/>
+              <a:t>, </a:t>
+            </a:r>
+            <a:r>
+              <a:rPr lang="pt-PT" sz="1100" dirty="0" err="1" smtClean="0"/>
+              <a:t>OrderId</a:t>
+            </a:r>
+            <a:endParaRPr lang="pt-PT" sz="1100" dirty="0" smtClean="0"/>
+          </a:p>
+          <a:p>
+            <a:r>
+              <a:rPr lang="pt-PT" sz="1100" dirty="0" smtClean="0"/>
+              <a:t>&lt;= </a:t>
+            </a:r>
+            <a:r>
+              <a:rPr lang="pt-PT" sz="1100" dirty="0" err="1" smtClean="0"/>
+              <a:t>CompensationDate</a:t>
+            </a:r>
+            <a:r>
+              <a:rPr lang="pt-PT" sz="1100" dirty="0" smtClean="0"/>
+              <a:t>, </a:t>
+            </a:r>
+            <a:r>
+              <a:rPr lang="pt-PT" sz="1100" dirty="0" err="1" smtClean="0"/>
+              <a:t>CompensatedPointsBalance</a:t>
+            </a:r>
+            <a:endParaRPr lang="pt-PT" sz="1100" dirty="0" smtClean="0"/>
+          </a:p>
+          <a:p>
+            <a:r>
+              <a:rPr lang="pt-PT" sz="1200" dirty="0" err="1" smtClean="0"/>
+              <a:t>Search</a:t>
+            </a:r>
+            <a:r>
+              <a:rPr lang="pt-PT" sz="1200" dirty="0" smtClean="0"/>
+              <a:t> </a:t>
+            </a:r>
+            <a:r>
+              <a:rPr lang="pt-PT" sz="1200" dirty="0" err="1" smtClean="0"/>
+              <a:t>Loyalty</a:t>
+            </a:r>
+            <a:r>
+              <a:rPr lang="pt-PT" sz="1200" dirty="0" smtClean="0"/>
+              <a:t> </a:t>
+            </a:r>
+            <a:r>
+              <a:rPr lang="pt-PT" sz="1200" dirty="0" err="1" smtClean="0"/>
+              <a:t>Points</a:t>
+            </a:r>
+            <a:r>
+              <a:rPr lang="pt-PT" sz="1200" dirty="0" smtClean="0"/>
+              <a:t> </a:t>
+            </a:r>
+            <a:r>
+              <a:rPr lang="pt-PT" sz="1200" dirty="0" err="1" smtClean="0"/>
+              <a:t>Transactions</a:t>
+            </a:r>
+            <a:endParaRPr lang="pt-PT" sz="1200" dirty="0" smtClean="0"/>
+          </a:p>
+          <a:p>
+            <a:pPr marL="171450" indent="-171450">
+              <a:buFont typeface="Symbol" panose="05050102010706020507" pitchFamily="18" charset="2"/>
+              <a:buChar char="Þ"/>
+            </a:pPr>
+            <a:r>
+              <a:rPr lang="pt-PT" sz="1100" dirty="0" smtClean="0"/>
+              <a:t>(</a:t>
+            </a:r>
+            <a:r>
+              <a:rPr lang="pt-PT" sz="1100" dirty="0" err="1" smtClean="0"/>
+              <a:t>search</a:t>
+            </a:r>
+            <a:r>
+              <a:rPr lang="pt-PT" sz="1100" dirty="0" smtClean="0"/>
+              <a:t> </a:t>
+            </a:r>
+            <a:r>
+              <a:rPr lang="pt-PT" sz="1100" dirty="0" err="1" smtClean="0"/>
+              <a:t>criteria</a:t>
+            </a:r>
+            <a:r>
+              <a:rPr lang="pt-PT" sz="1100" dirty="0" smtClean="0"/>
+              <a:t>)</a:t>
+            </a:r>
+            <a:endParaRPr lang="pt-PT" sz="1100" dirty="0"/>
+          </a:p>
+          <a:p>
+            <a:r>
+              <a:rPr lang="pt-PT" sz="1100" dirty="0"/>
+              <a:t>&lt;= </a:t>
+            </a:r>
+            <a:r>
+              <a:rPr lang="pt-PT" sz="1100" dirty="0" err="1" smtClean="0"/>
+              <a:t>Loyalty</a:t>
+            </a:r>
+            <a:r>
+              <a:rPr lang="pt-PT" sz="1100" dirty="0" smtClean="0"/>
+              <a:t> </a:t>
+            </a:r>
+            <a:r>
+              <a:rPr lang="pt-PT" sz="1100" dirty="0" err="1" smtClean="0"/>
+              <a:t>Points</a:t>
+            </a:r>
+            <a:r>
+              <a:rPr lang="pt-PT" sz="1100" dirty="0" smtClean="0"/>
+              <a:t> </a:t>
+            </a:r>
+            <a:r>
+              <a:rPr lang="pt-PT" sz="1100" dirty="0" err="1" smtClean="0"/>
+              <a:t>movements</a:t>
+            </a:r>
+            <a:endParaRPr lang="pt-PT" sz="1100" dirty="0" smtClean="0"/>
+          </a:p>
+        </p:txBody>
+      </p:sp>
+      <p:sp>
+        <p:nvSpPr>
+          <p:cNvPr id="17" name="Down Arrow 16"/>
+          <p:cNvSpPr/>
+          <p:nvPr/>
+        </p:nvSpPr>
+        <p:spPr>
+          <a:xfrm>
+            <a:off x="7385900" y="3167405"/>
+            <a:ext cx="1508288" cy="933253"/>
+          </a:xfrm>
+          <a:prstGeom prst="downArrow">
+            <a:avLst/>
+          </a:prstGeom>
+        </p:spPr>
+        <p:style>
+          <a:lnRef idx="2">
+            <a:schemeClr val="accent6">
+              <a:shade val="50000"/>
+            </a:schemeClr>
+          </a:lnRef>
+          <a:fillRef idx="1">
+            <a:schemeClr val="accent6"/>
+          </a:fillRef>
+          <a:effectRef idx="0">
+            <a:schemeClr val="accent6"/>
+          </a:effectRef>
+          <a:fontRef idx="minor">
+            <a:schemeClr val="lt1"/>
+          </a:fontRef>
+        </p:style>
+        <p:txBody>
+          <a:bodyPr rtlCol="0" anchor="ctr"/>
+          <a:lstStyle/>
+          <a:p>
+            <a:pPr algn="ctr"/>
+            <a:r>
+              <a:rPr lang="pt-PT" sz="2800" dirty="0" smtClean="0"/>
+              <a:t>API</a:t>
+            </a:r>
+            <a:endParaRPr lang="en-US" dirty="0"/>
+          </a:p>
+        </p:txBody>
+      </p:sp>
+      <p:sp>
+        <p:nvSpPr>
+          <p:cNvPr id="18" name="Folded Corner 17"/>
+          <p:cNvSpPr/>
+          <p:nvPr/>
+        </p:nvSpPr>
+        <p:spPr>
+          <a:xfrm>
+            <a:off x="6403155" y="1564849"/>
+            <a:ext cx="3473777" cy="1734532"/>
+          </a:xfrm>
+          <a:prstGeom prst="foldedCorner">
+            <a:avLst/>
+          </a:prstGeom>
+        </p:spPr>
+        <p:style>
+          <a:lnRef idx="2">
+            <a:schemeClr val="accent2"/>
+          </a:lnRef>
+          <a:fillRef idx="1">
+            <a:schemeClr val="lt1"/>
+          </a:fillRef>
+          <a:effectRef idx="0">
+            <a:schemeClr val="accent2"/>
+          </a:effectRef>
+          <a:fontRef idx="minor">
+            <a:schemeClr val="dk1"/>
+          </a:fontRef>
+        </p:style>
+        <p:txBody>
+          <a:bodyPr rtlCol="0" anchor="t"/>
+          <a:lstStyle/>
+          <a:p>
+            <a:r>
+              <a:rPr lang="pt-PT" b="1" i="1" dirty="0" err="1" smtClean="0"/>
+              <a:t>Loyalty</a:t>
+            </a:r>
+            <a:r>
+              <a:rPr lang="pt-PT" b="1" i="1" dirty="0" smtClean="0"/>
+              <a:t> Program </a:t>
+            </a:r>
+            <a:r>
+              <a:rPr lang="pt-PT" b="1" i="1" dirty="0" err="1" smtClean="0"/>
+              <a:t>Operations</a:t>
+            </a:r>
+            <a:r>
+              <a:rPr lang="pt-PT" b="1" i="1" dirty="0" smtClean="0"/>
+              <a:t> (Status)</a:t>
+            </a:r>
+          </a:p>
+          <a:p>
+            <a:r>
+              <a:rPr lang="pt-PT" sz="1200" dirty="0" err="1" smtClean="0"/>
+              <a:t>Search</a:t>
+            </a:r>
+            <a:r>
+              <a:rPr lang="pt-PT" sz="1200" dirty="0" smtClean="0"/>
+              <a:t> </a:t>
+            </a:r>
+            <a:r>
+              <a:rPr lang="pt-PT" sz="1200" dirty="0" err="1"/>
+              <a:t>Loyalty</a:t>
+            </a:r>
+            <a:r>
+              <a:rPr lang="pt-PT" sz="1200" dirty="0"/>
+              <a:t> </a:t>
+            </a:r>
+            <a:r>
+              <a:rPr lang="pt-PT" sz="1200" dirty="0" smtClean="0"/>
+              <a:t>Status</a:t>
+            </a:r>
+          </a:p>
+          <a:p>
+            <a:pPr marL="171450" indent="-171450">
+              <a:buFont typeface="Symbol" panose="05050102010706020507" pitchFamily="18" charset="2"/>
+              <a:buChar char="Þ"/>
+            </a:pPr>
+            <a:r>
+              <a:rPr lang="pt-PT" sz="1100" dirty="0" smtClean="0"/>
+              <a:t>(</a:t>
+            </a:r>
+            <a:r>
+              <a:rPr lang="pt-PT" sz="1100" dirty="0" err="1"/>
+              <a:t>search</a:t>
+            </a:r>
+            <a:r>
+              <a:rPr lang="pt-PT" sz="1100" dirty="0"/>
+              <a:t> </a:t>
+            </a:r>
+            <a:r>
+              <a:rPr lang="pt-PT" sz="1100" dirty="0" err="1"/>
+              <a:t>criteria</a:t>
+            </a:r>
+            <a:r>
+              <a:rPr lang="pt-PT" sz="1100" dirty="0" smtClean="0"/>
+              <a:t>)</a:t>
+            </a:r>
+          </a:p>
+          <a:p>
+            <a:r>
+              <a:rPr lang="pt-PT" sz="1100" dirty="0" smtClean="0"/>
+              <a:t>&lt;= Status</a:t>
+            </a:r>
+          </a:p>
+          <a:p>
+            <a:r>
+              <a:rPr lang="pt-PT" sz="1200" dirty="0" err="1" smtClean="0"/>
+              <a:t>Recalculate</a:t>
+            </a:r>
+            <a:r>
+              <a:rPr lang="pt-PT" sz="1200" dirty="0" smtClean="0"/>
+              <a:t> </a:t>
+            </a:r>
+            <a:r>
+              <a:rPr lang="pt-PT" sz="1200" dirty="0" err="1" smtClean="0"/>
+              <a:t>Loyalty</a:t>
+            </a:r>
+            <a:r>
+              <a:rPr lang="pt-PT" sz="1200" dirty="0" smtClean="0"/>
+              <a:t> Status</a:t>
+            </a:r>
+          </a:p>
+          <a:p>
+            <a:pPr marL="171450" indent="-171450">
+              <a:buFont typeface="Symbol" panose="05050102010706020507" pitchFamily="18" charset="2"/>
+              <a:buChar char="Þ"/>
+            </a:pPr>
+            <a:r>
+              <a:rPr lang="pt-PT" sz="1100" dirty="0" err="1" smtClean="0"/>
+              <a:t>CustomerId</a:t>
+            </a:r>
+            <a:endParaRPr lang="pt-PT" sz="1100" dirty="0" smtClean="0"/>
+          </a:p>
+          <a:p>
+            <a:r>
+              <a:rPr lang="pt-PT" sz="1100" dirty="0" smtClean="0"/>
+              <a:t>&lt;= Status</a:t>
+            </a:r>
+            <a:endParaRPr lang="pt-PT" sz="1200" dirty="0"/>
+          </a:p>
+          <a:p>
+            <a:endParaRPr lang="en-US" sz="1100" dirty="0"/>
+          </a:p>
+        </p:txBody>
+      </p:sp>
+      <p:sp>
+        <p:nvSpPr>
+          <p:cNvPr id="19" name="Rounded Rectangle 18"/>
+          <p:cNvSpPr/>
+          <p:nvPr/>
+        </p:nvSpPr>
+        <p:spPr>
+          <a:xfrm>
+            <a:off x="3535052" y="4184239"/>
+            <a:ext cx="1857080" cy="617455"/>
+          </a:xfrm>
+          <a:prstGeom prst="roundRect">
+            <a:avLst/>
+          </a:prstGeom>
+        </p:spPr>
+        <p:style>
+          <a:lnRef idx="1">
+            <a:schemeClr val="accent1"/>
+          </a:lnRef>
+          <a:fillRef idx="2">
+            <a:schemeClr val="accent1"/>
+          </a:fillRef>
+          <a:effectRef idx="1">
+            <a:schemeClr val="accent1"/>
+          </a:effectRef>
+          <a:fontRef idx="minor">
+            <a:schemeClr val="dk1"/>
+          </a:fontRef>
+        </p:style>
+        <p:txBody>
+          <a:bodyPr rtlCol="0" anchor="ctr"/>
+          <a:lstStyle/>
+          <a:p>
+            <a:pPr algn="ctr"/>
+            <a:r>
+              <a:rPr lang="pt-PT" dirty="0" err="1" smtClean="0"/>
+              <a:t>Points</a:t>
+            </a:r>
+            <a:r>
+              <a:rPr lang="pt-PT" dirty="0" smtClean="0"/>
+              <a:t> </a:t>
+            </a:r>
+            <a:r>
+              <a:rPr lang="pt-PT" dirty="0" err="1" smtClean="0"/>
+              <a:t>Engine</a:t>
+            </a:r>
+            <a:endParaRPr lang="en-US" dirty="0"/>
+          </a:p>
+        </p:txBody>
+      </p:sp>
+      <p:sp>
+        <p:nvSpPr>
+          <p:cNvPr id="20" name="Rounded Rectangle 19"/>
+          <p:cNvSpPr/>
+          <p:nvPr/>
+        </p:nvSpPr>
+        <p:spPr>
+          <a:xfrm>
+            <a:off x="3535052" y="5148130"/>
+            <a:ext cx="1857080" cy="617455"/>
+          </a:xfrm>
+          <a:prstGeom prst="roundRect">
+            <a:avLst/>
+          </a:prstGeom>
+        </p:spPr>
+        <p:style>
+          <a:lnRef idx="1">
+            <a:schemeClr val="accent1"/>
+          </a:lnRef>
+          <a:fillRef idx="2">
+            <a:schemeClr val="accent1"/>
+          </a:fillRef>
+          <a:effectRef idx="1">
+            <a:schemeClr val="accent1"/>
+          </a:effectRef>
+          <a:fontRef idx="minor">
+            <a:schemeClr val="dk1"/>
+          </a:fontRef>
+        </p:style>
+        <p:txBody>
+          <a:bodyPr rtlCol="0" anchor="ctr"/>
+          <a:lstStyle/>
+          <a:p>
+            <a:pPr algn="ctr"/>
+            <a:r>
+              <a:rPr lang="pt-PT" dirty="0" smtClean="0"/>
+              <a:t>LP </a:t>
+            </a:r>
+            <a:r>
+              <a:rPr lang="pt-PT" dirty="0" err="1" smtClean="0"/>
+              <a:t>Points</a:t>
+            </a:r>
+            <a:r>
+              <a:rPr lang="pt-PT" dirty="0" smtClean="0"/>
+              <a:t> Log</a:t>
+            </a:r>
+            <a:endParaRPr lang="en-US" dirty="0"/>
+          </a:p>
+        </p:txBody>
+      </p:sp>
+      <p:sp>
+        <p:nvSpPr>
+          <p:cNvPr id="21" name="Rounded Rectangle 20"/>
+          <p:cNvSpPr/>
+          <p:nvPr/>
+        </p:nvSpPr>
+        <p:spPr>
+          <a:xfrm>
+            <a:off x="7252437" y="4216135"/>
+            <a:ext cx="1857080" cy="617455"/>
+          </a:xfrm>
+          <a:prstGeom prst="roundRect">
+            <a:avLst/>
+          </a:prstGeom>
+        </p:spPr>
+        <p:style>
+          <a:lnRef idx="1">
+            <a:schemeClr val="accent1"/>
+          </a:lnRef>
+          <a:fillRef idx="2">
+            <a:schemeClr val="accent1"/>
+          </a:fillRef>
+          <a:effectRef idx="1">
+            <a:schemeClr val="accent1"/>
+          </a:effectRef>
+          <a:fontRef idx="minor">
+            <a:schemeClr val="dk1"/>
+          </a:fontRef>
+        </p:style>
+        <p:txBody>
+          <a:bodyPr rtlCol="0" anchor="ctr"/>
+          <a:lstStyle/>
+          <a:p>
+            <a:pPr algn="ctr"/>
+            <a:r>
+              <a:rPr lang="pt-PT" dirty="0" smtClean="0"/>
+              <a:t>Status </a:t>
+            </a:r>
+            <a:r>
+              <a:rPr lang="pt-PT" dirty="0" err="1" smtClean="0"/>
+              <a:t>Engine</a:t>
+            </a:r>
+            <a:endParaRPr lang="en-US" dirty="0"/>
+          </a:p>
+        </p:txBody>
+      </p:sp>
+      <p:sp>
+        <p:nvSpPr>
+          <p:cNvPr id="22" name="Rounded Rectangle 21"/>
+          <p:cNvSpPr/>
+          <p:nvPr/>
+        </p:nvSpPr>
+        <p:spPr>
+          <a:xfrm>
+            <a:off x="7252437" y="5148129"/>
+            <a:ext cx="1857080" cy="617455"/>
+          </a:xfrm>
+          <a:prstGeom prst="roundRect">
+            <a:avLst/>
+          </a:prstGeom>
+        </p:spPr>
+        <p:style>
+          <a:lnRef idx="1">
+            <a:schemeClr val="accent1"/>
+          </a:lnRef>
+          <a:fillRef idx="2">
+            <a:schemeClr val="accent1"/>
+          </a:fillRef>
+          <a:effectRef idx="1">
+            <a:schemeClr val="accent1"/>
+          </a:effectRef>
+          <a:fontRef idx="minor">
+            <a:schemeClr val="dk1"/>
+          </a:fontRef>
+        </p:style>
+        <p:txBody>
+          <a:bodyPr rtlCol="0" anchor="ctr"/>
+          <a:lstStyle/>
+          <a:p>
+            <a:pPr algn="ctr"/>
+            <a:r>
+              <a:rPr lang="pt-PT" dirty="0" smtClean="0"/>
+              <a:t>LP Status Log</a:t>
+            </a:r>
+            <a:endParaRPr lang="en-US" dirty="0"/>
+          </a:p>
+        </p:txBody>
+      </p:sp>
+      <p:cxnSp>
+        <p:nvCxnSpPr>
+          <p:cNvPr id="24" name="Straight Arrow Connector 23"/>
+          <p:cNvCxnSpPr>
+            <a:stCxn id="19" idx="2"/>
+            <a:endCxn id="20" idx="0"/>
+          </p:cNvCxnSpPr>
+          <p:nvPr/>
+        </p:nvCxnSpPr>
+        <p:spPr>
+          <a:xfrm>
+            <a:off x="4463592" y="4801694"/>
+            <a:ext cx="0" cy="346436"/>
+          </a:xfrm>
+          <a:prstGeom prst="straightConnector1">
+            <a:avLst/>
+          </a:prstGeom>
+          <a:ln>
+            <a:tailEnd type="triangle"/>
+          </a:ln>
+        </p:spPr>
+        <p:style>
+          <a:lnRef idx="3">
+            <a:schemeClr val="accent4"/>
+          </a:lnRef>
+          <a:fillRef idx="0">
+            <a:schemeClr val="accent4"/>
+          </a:fillRef>
+          <a:effectRef idx="2">
+            <a:schemeClr val="accent4"/>
+          </a:effectRef>
+          <a:fontRef idx="minor">
+            <a:schemeClr val="tx1"/>
+          </a:fontRef>
+        </p:style>
+      </p:cxnSp>
+      <p:cxnSp>
+        <p:nvCxnSpPr>
+          <p:cNvPr id="26" name="Straight Arrow Connector 25"/>
+          <p:cNvCxnSpPr>
+            <a:stCxn id="21" idx="2"/>
+            <a:endCxn id="22" idx="0"/>
+          </p:cNvCxnSpPr>
+          <p:nvPr/>
+        </p:nvCxnSpPr>
+        <p:spPr>
+          <a:xfrm>
+            <a:off x="8180977" y="4833590"/>
+            <a:ext cx="0" cy="314539"/>
+          </a:xfrm>
+          <a:prstGeom prst="straightConnector1">
+            <a:avLst/>
+          </a:prstGeom>
+          <a:ln>
+            <a:tailEnd type="triangle"/>
+          </a:ln>
+        </p:spPr>
+        <p:style>
+          <a:lnRef idx="3">
+            <a:schemeClr val="accent4"/>
+          </a:lnRef>
+          <a:fillRef idx="0">
+            <a:schemeClr val="accent4"/>
+          </a:fillRef>
+          <a:effectRef idx="2">
+            <a:schemeClr val="accent4"/>
+          </a:effectRef>
+          <a:fontRef idx="minor">
+            <a:schemeClr val="tx1"/>
+          </a:fontRef>
+        </p:style>
+      </p:cxnSp>
+      <p:sp>
+        <p:nvSpPr>
+          <p:cNvPr id="33" name="Rectangle 32"/>
+          <p:cNvSpPr/>
+          <p:nvPr/>
+        </p:nvSpPr>
+        <p:spPr>
+          <a:xfrm>
+            <a:off x="7002379" y="6280484"/>
+            <a:ext cx="5342021" cy="2165684"/>
+          </a:xfrm>
+          <a:prstGeom prst="rect">
+            <a:avLst/>
+          </a:prstGeom>
+        </p:spPr>
+        <p:style>
+          <a:lnRef idx="2">
+            <a:schemeClr val="accent6">
+              <a:shade val="50000"/>
+            </a:schemeClr>
+          </a:lnRef>
+          <a:fillRef idx="1">
+            <a:schemeClr val="accent6"/>
+          </a:fillRef>
+          <a:effectRef idx="0">
+            <a:schemeClr val="accent6"/>
+          </a:effectRef>
+          <a:fontRef idx="minor">
+            <a:schemeClr val="lt1"/>
+          </a:fontRef>
+        </p:style>
+        <p:txBody>
+          <a:bodyPr rtlCol="0" anchor="t"/>
+          <a:lstStyle/>
+          <a:p>
+            <a:r>
+              <a:rPr lang="pt-PT" sz="2400" b="1" dirty="0" err="1" smtClean="0"/>
+              <a:t>Loyalty</a:t>
+            </a:r>
+            <a:r>
+              <a:rPr lang="pt-PT" sz="2400" b="1" dirty="0" smtClean="0"/>
+              <a:t> Program (LP) UI </a:t>
+            </a:r>
+            <a:r>
+              <a:rPr lang="pt-PT" sz="2400" b="1" dirty="0" err="1" smtClean="0"/>
+              <a:t>Microservice</a:t>
+            </a:r>
+            <a:endParaRPr lang="pt-PT" sz="2400" b="1" dirty="0" smtClean="0"/>
+          </a:p>
+          <a:p>
+            <a:endParaRPr lang="en-US" sz="2000" dirty="0"/>
+          </a:p>
+        </p:txBody>
+      </p:sp>
+      <p:sp>
+        <p:nvSpPr>
+          <p:cNvPr id="34" name="Rectangle 33"/>
+          <p:cNvSpPr/>
+          <p:nvPr/>
+        </p:nvSpPr>
+        <p:spPr>
+          <a:xfrm>
+            <a:off x="7146758" y="6783677"/>
+            <a:ext cx="2322095" cy="1469986"/>
+          </a:xfrm>
+          <a:prstGeom prst="rect">
+            <a:avLst/>
+          </a:prstGeom>
+        </p:spPr>
+        <p:style>
+          <a:lnRef idx="2">
+            <a:schemeClr val="accent1">
+              <a:shade val="50000"/>
+            </a:schemeClr>
+          </a:lnRef>
+          <a:fillRef idx="1">
+            <a:schemeClr val="accent1"/>
+          </a:fillRef>
+          <a:effectRef idx="0">
+            <a:schemeClr val="accent1"/>
+          </a:effectRef>
+          <a:fontRef idx="minor">
+            <a:schemeClr val="lt1"/>
+          </a:fontRef>
+        </p:style>
+        <p:txBody>
+          <a:bodyPr rtlCol="0" anchor="ctr"/>
+          <a:lstStyle/>
+          <a:p>
+            <a:pPr algn="ctr"/>
+            <a:r>
+              <a:rPr lang="pt-PT" dirty="0" err="1" smtClean="0"/>
+              <a:t>Loyalty</a:t>
+            </a:r>
+            <a:r>
+              <a:rPr lang="pt-PT" dirty="0" smtClean="0"/>
+              <a:t> Program </a:t>
+            </a:r>
+            <a:r>
+              <a:rPr lang="pt-PT" dirty="0" err="1" smtClean="0"/>
+              <a:t>Points</a:t>
+            </a:r>
+            <a:r>
+              <a:rPr lang="pt-PT" dirty="0" smtClean="0"/>
+              <a:t> UI</a:t>
+            </a:r>
+            <a:endParaRPr lang="en-US" dirty="0"/>
+          </a:p>
+        </p:txBody>
+      </p:sp>
+      <p:sp>
+        <p:nvSpPr>
+          <p:cNvPr id="35" name="Rectangle 34"/>
+          <p:cNvSpPr/>
+          <p:nvPr/>
+        </p:nvSpPr>
+        <p:spPr>
+          <a:xfrm>
+            <a:off x="9869905" y="6783677"/>
+            <a:ext cx="2322095" cy="1469986"/>
+          </a:xfrm>
+          <a:prstGeom prst="rect">
+            <a:avLst/>
+          </a:prstGeom>
+        </p:spPr>
+        <p:style>
+          <a:lnRef idx="2">
+            <a:schemeClr val="accent1">
+              <a:shade val="50000"/>
+            </a:schemeClr>
+          </a:lnRef>
+          <a:fillRef idx="1">
+            <a:schemeClr val="accent1"/>
+          </a:fillRef>
+          <a:effectRef idx="0">
+            <a:schemeClr val="accent1"/>
+          </a:effectRef>
+          <a:fontRef idx="minor">
+            <a:schemeClr val="lt1"/>
+          </a:fontRef>
+        </p:style>
+        <p:txBody>
+          <a:bodyPr rtlCol="0" anchor="ctr"/>
+          <a:lstStyle/>
+          <a:p>
+            <a:pPr algn="ctr"/>
+            <a:r>
+              <a:rPr lang="pt-PT" dirty="0" err="1" smtClean="0"/>
+              <a:t>Loyalty</a:t>
+            </a:r>
+            <a:r>
+              <a:rPr lang="pt-PT" dirty="0" smtClean="0"/>
+              <a:t> </a:t>
+            </a:r>
+            <a:r>
+              <a:rPr lang="pt-PT" smtClean="0"/>
+              <a:t>Program Status UI</a:t>
+            </a:r>
+            <a:endParaRPr lang="en-US" dirty="0"/>
+          </a:p>
+        </p:txBody>
+      </p:sp>
+    </p:spTree>
+    <p:extLst>
+      <p:ext uri="{BB962C8B-B14F-4D97-AF65-F5344CB8AC3E}">
+        <p14:creationId xmlns:p14="http://schemas.microsoft.com/office/powerpoint/2010/main" val="2189351234"/>
+      </p:ext>
+    </p:extLst>
+  </p:cSld>
+  <p:clrMapOvr>
+    <a:masterClrMapping/>
+  </p:clrMapOvr>
+  <p:timing>
+    <p:tnLst>
+      <p:par>
+        <p:cTn id="1" dur="indefinite" restart="never" nodeType="tmRoot"/>
+      </p:par>
+    </p:tnLst>
+  </p:timing>
 </p:sld>
 </file>
 

</xml_diff>